<commit_message>
Edit PPT Final test
</commit_message>
<xml_diff>
--- a/PPT Final Test.pptx
+++ b/PPT Final Test.pptx
@@ -12,7 +12,6 @@
     <p:sldId id="259" r:id="rId6"/>
     <p:sldId id="261" r:id="rId7"/>
     <p:sldId id="262" r:id="rId8"/>
-    <p:sldId id="263" r:id="rId9"/>
   </p:sldIdLst>
   <p:sldSz cx="9144000" cy="5143500" type="screen16x9"/>
   <p:notesSz cx="6858000" cy="9144000"/>
@@ -4110,11 +4109,7 @@
             <a:pPr algn="r"/>
             <a:r>
               <a:rPr lang="en-US" altLang="ko-KR" b="1" dirty="0" smtClean="0"/>
-              <a:t>Booking Meeting Room </a:t>
-            </a:r>
-            <a:r>
-              <a:rPr lang="en-US" altLang="ko-KR" b="1" dirty="0" smtClean="0"/>
-              <a:t>System</a:t>
+              <a:t>Booking Meeting Room System</a:t>
             </a:r>
             <a:endParaRPr lang="en-US" b="1" dirty="0">
               <a:latin typeface="Arial" pitchFamily="34" charset="0"/>
@@ -4208,21 +4203,14 @@
           </a:p>
           <a:p>
             <a:r>
-              <a:rPr lang="en-US" altLang="ko-KR" sz="1800" dirty="0" err="1" smtClean="0"/>
-              <a:t>Dibangun</a:t>
-            </a:r>
-            <a:r>
-              <a:rPr lang="en-US" altLang="ko-KR" sz="1800" dirty="0" smtClean="0"/>
-              <a:t> </a:t>
-            </a:r>
-            <a:r>
-              <a:rPr lang="en-US" altLang="ko-KR" sz="1800" dirty="0" err="1" smtClean="0"/>
-              <a:t>dengan</a:t>
-            </a:r>
-            <a:r>
-              <a:rPr lang="en-US" altLang="ko-KR" sz="1800" dirty="0" smtClean="0"/>
+              <a:rPr lang="en-US" altLang="ko-KR" sz="1800" b="1" dirty="0" err="1" smtClean="0"/>
+              <a:t>Teknologi</a:t>
+            </a:r>
+            <a:r>
+              <a:rPr lang="en-US" altLang="ko-KR" sz="1800" b="1" dirty="0" smtClean="0"/>
               <a:t> :</a:t>
             </a:r>
+            <a:endParaRPr lang="en-US" altLang="ko-KR" sz="1800" b="1" dirty="0" smtClean="0"/>
           </a:p>
           <a:p>
             <a:endParaRPr lang="en-US" altLang="ko-KR" sz="1800" dirty="0" smtClean="0"/>
@@ -5727,422 +5715,6 @@
     <p:extLst>
       <p:ext uri="{BB962C8B-B14F-4D97-AF65-F5344CB8AC3E}">
         <p14:creationId xmlns:p14="http://schemas.microsoft.com/office/powerpoint/2010/main" val="2779799877"/>
-      </p:ext>
-    </p:extLst>
-  </p:cSld>
-  <p:clrMapOvr>
-    <a:masterClrMapping/>
-  </p:clrMapOvr>
-</p:sld>
-</file>
-
-<file path=ppt/slides/slide7.xml><?xml version="1.0" encoding="utf-8"?>
-<p:sld xmlns:a="http://schemas.openxmlformats.org/drawingml/2006/main" xmlns:r="http://schemas.openxmlformats.org/officeDocument/2006/relationships" xmlns:p="http://schemas.openxmlformats.org/presentationml/2006/main">
-  <p:cSld>
-    <p:spTree>
-      <p:nvGrpSpPr>
-        <p:cNvPr id="1" name=""/>
-        <p:cNvGrpSpPr/>
-        <p:nvPr/>
-      </p:nvGrpSpPr>
-      <p:grpSpPr>
-        <a:xfrm>
-          <a:off x="0" y="0"/>
-          <a:ext cx="0" cy="0"/>
-          <a:chOff x="0" y="0"/>
-          <a:chExt cx="0" cy="0"/>
-        </a:xfrm>
-      </p:grpSpPr>
-      <p:sp>
-        <p:nvSpPr>
-          <p:cNvPr id="2" name="Title 1"/>
-          <p:cNvSpPr>
-            <a:spLocks noGrp="1"/>
-          </p:cNvSpPr>
-          <p:nvPr>
-            <p:ph type="title"/>
-          </p:nvPr>
-        </p:nvSpPr>
-        <p:spPr>
-          <a:xfrm>
-            <a:off x="395536" y="0"/>
-            <a:ext cx="8748464" cy="884466"/>
-          </a:xfrm>
-        </p:spPr>
-        <p:txBody>
-          <a:bodyPr/>
-          <a:lstStyle/>
-          <a:p>
-            <a:r>
-              <a:rPr lang="en-US" dirty="0" err="1" smtClean="0"/>
-              <a:t>Penanggung</a:t>
-            </a:r>
-            <a:r>
-              <a:rPr lang="en-US" dirty="0" smtClean="0"/>
-              <a:t> </a:t>
-            </a:r>
-            <a:r>
-              <a:rPr lang="en-US" dirty="0" err="1" smtClean="0"/>
-              <a:t>Jawab</a:t>
-            </a:r>
-            <a:r>
-              <a:rPr lang="en-US" dirty="0" smtClean="0"/>
-              <a:t> </a:t>
-            </a:r>
-            <a:r>
-              <a:rPr lang="en-US" dirty="0" err="1" smtClean="0"/>
-              <a:t>Fitur</a:t>
-            </a:r>
-            <a:endParaRPr lang="en-US" dirty="0"/>
-          </a:p>
-        </p:txBody>
-      </p:sp>
-      <p:sp>
-        <p:nvSpPr>
-          <p:cNvPr id="3" name="Content Placeholder 2"/>
-          <p:cNvSpPr>
-            <a:spLocks noGrp="1"/>
-          </p:cNvSpPr>
-          <p:nvPr>
-            <p:ph idx="1"/>
-          </p:nvPr>
-        </p:nvSpPr>
-        <p:spPr>
-          <a:xfrm>
-            <a:off x="4427984" y="1275606"/>
-            <a:ext cx="4373876" cy="3528392"/>
-          </a:xfrm>
-        </p:spPr>
-        <p:txBody>
-          <a:bodyPr anchor="t"/>
-          <a:lstStyle/>
-          <a:p>
-            <a:pPr algn="ctr"/>
-            <a:r>
-              <a:rPr lang="en-US" sz="1800" b="1" dirty="0" smtClean="0"/>
-              <a:t>DIAS</a:t>
-            </a:r>
-            <a:endParaRPr lang="en-US" sz="1800" b="1" dirty="0"/>
-          </a:p>
-          <a:p>
-            <a:pPr algn="ctr"/>
-            <a:endParaRPr lang="en-US" sz="1800" dirty="0"/>
-          </a:p>
-          <a:p>
-            <a:pPr algn="ctr"/>
-            <a:r>
-              <a:rPr lang="en-US" sz="1800" dirty="0"/>
-              <a:t>Upcoming Booking</a:t>
-            </a:r>
-          </a:p>
-          <a:p>
-            <a:pPr algn="ctr"/>
-            <a:r>
-              <a:rPr lang="en-US" sz="1800" dirty="0"/>
-              <a:t>Check Booking by Ticket</a:t>
-            </a:r>
-          </a:p>
-          <a:p>
-            <a:pPr algn="ctr"/>
-            <a:r>
-              <a:rPr lang="en-US" sz="1800" dirty="0"/>
-              <a:t>Room Manage</a:t>
-            </a:r>
-          </a:p>
-          <a:p>
-            <a:pPr algn="ctr"/>
-            <a:r>
-              <a:rPr lang="en-US" sz="1800" dirty="0"/>
-              <a:t>Office Manage</a:t>
-            </a:r>
-          </a:p>
-          <a:p>
-            <a:pPr algn="ctr"/>
-            <a:r>
-              <a:rPr lang="en-US" sz="1800" dirty="0"/>
-              <a:t>Employee Manage</a:t>
-            </a:r>
-          </a:p>
-          <a:p>
-            <a:pPr algn="ctr"/>
-            <a:r>
-              <a:rPr lang="en-US" sz="1800" dirty="0"/>
-              <a:t>Booking </a:t>
-            </a:r>
-            <a:r>
-              <a:rPr lang="en-US" sz="1800" dirty="0" smtClean="0"/>
-              <a:t>Manage</a:t>
-            </a:r>
-            <a:endParaRPr lang="en-US" sz="1800" dirty="0"/>
-          </a:p>
-          <a:p>
-            <a:pPr algn="ctr"/>
-            <a:r>
-              <a:rPr lang="en-US" sz="1800" dirty="0"/>
-              <a:t>Logout</a:t>
-            </a:r>
-          </a:p>
-          <a:p>
-            <a:pPr algn="ctr"/>
-            <a:endParaRPr lang="en-US" sz="1800" dirty="0" smtClean="0"/>
-          </a:p>
-          <a:p>
-            <a:pPr algn="just"/>
-            <a:endParaRPr lang="en-US" sz="1800" dirty="0"/>
-          </a:p>
-        </p:txBody>
-      </p:sp>
-      <p:sp>
-        <p:nvSpPr>
-          <p:cNvPr id="4" name="Content Placeholder 3"/>
-          <p:cNvSpPr>
-            <a:spLocks noGrp="1"/>
-          </p:cNvSpPr>
-          <p:nvPr>
-            <p:ph idx="10"/>
-          </p:nvPr>
-        </p:nvSpPr>
-        <p:spPr>
-          <a:xfrm>
-            <a:off x="0" y="1275606"/>
-            <a:ext cx="4427984" cy="3528393"/>
-          </a:xfrm>
-        </p:spPr>
-        <p:txBody>
-          <a:bodyPr/>
-          <a:lstStyle/>
-          <a:p>
-            <a:pPr algn="ctr"/>
-            <a:r>
-              <a:rPr lang="en-US" sz="1800" b="1" dirty="0"/>
-              <a:t>AUDINE</a:t>
-            </a:r>
-          </a:p>
-          <a:p>
-            <a:pPr algn="ctr"/>
-            <a:endParaRPr lang="en-US" sz="1800" dirty="0"/>
-          </a:p>
-          <a:p>
-            <a:pPr algn="ctr"/>
-            <a:r>
-              <a:rPr lang="en-US" sz="1800" dirty="0"/>
-              <a:t>Login</a:t>
-            </a:r>
-          </a:p>
-          <a:p>
-            <a:pPr algn="ctr"/>
-            <a:r>
-              <a:rPr lang="en-US" sz="1800" dirty="0" smtClean="0"/>
-              <a:t>Register</a:t>
-            </a:r>
-          </a:p>
-          <a:p>
-            <a:pPr algn="ctr"/>
-            <a:r>
-              <a:rPr lang="en-US" sz="1800" dirty="0" smtClean="0"/>
-              <a:t>Check Available Room</a:t>
-            </a:r>
-            <a:endParaRPr lang="en-US" sz="1800" dirty="0"/>
-          </a:p>
-          <a:p>
-            <a:pPr algn="ctr"/>
-            <a:r>
-              <a:rPr lang="en-US" sz="1800" dirty="0"/>
-              <a:t>Your Booking</a:t>
-            </a:r>
-          </a:p>
-          <a:p>
-            <a:pPr algn="ctr"/>
-            <a:r>
-              <a:rPr lang="en-US" sz="1800" dirty="0"/>
-              <a:t>Add Booking</a:t>
-            </a:r>
-          </a:p>
-          <a:p>
-            <a:pPr algn="ctr"/>
-            <a:r>
-              <a:rPr lang="en-US" sz="1800" dirty="0"/>
-              <a:t>Image Uploading</a:t>
-            </a:r>
-          </a:p>
-          <a:p>
-            <a:pPr algn="ctr"/>
-            <a:endParaRPr lang="en-US" sz="1800" dirty="0"/>
-          </a:p>
-        </p:txBody>
-      </p:sp>
-      <p:sp>
-        <p:nvSpPr>
-          <p:cNvPr id="5" name="TextBox 4">
-            <a:hlinkClick r:id="rId2"/>
-          </p:cNvPr>
-          <p:cNvSpPr txBox="1"/>
-          <p:nvPr/>
-        </p:nvSpPr>
-        <p:spPr>
-          <a:xfrm>
-            <a:off x="0" y="4803998"/>
-            <a:ext cx="8783960" cy="230832"/>
-          </a:xfrm>
-          <a:prstGeom prst="rect">
-            <a:avLst/>
-          </a:prstGeom>
-          <a:noFill/>
-        </p:spPr>
-        <p:txBody>
-          <a:bodyPr wrap="square" rtlCol="0">
-            <a:spAutoFit/>
-          </a:bodyPr>
-          <a:lstStyle/>
-          <a:p>
-            <a:pPr algn="r"/>
-            <a:r>
-              <a:rPr lang="en-US" altLang="ko-KR" sz="900" dirty="0" smtClean="0">
-                <a:solidFill>
-                  <a:schemeClr val="tx1">
-                    <a:lumMod val="50000"/>
-                    <a:lumOff val="50000"/>
-                  </a:schemeClr>
-                </a:solidFill>
-                <a:latin typeface="Arial" pitchFamily="34" charset="0"/>
-                <a:cs typeface="Arial" pitchFamily="34" charset="0"/>
-              </a:rPr>
-              <a:t>Future Program Batch 1 – </a:t>
-            </a:r>
-            <a:r>
-              <a:rPr lang="en-US" altLang="ko-KR" sz="900" dirty="0" err="1" smtClean="0">
-                <a:solidFill>
-                  <a:schemeClr val="tx1">
-                    <a:lumMod val="50000"/>
-                    <a:lumOff val="50000"/>
-                  </a:schemeClr>
-                </a:solidFill>
-                <a:latin typeface="Arial" pitchFamily="34" charset="0"/>
-                <a:cs typeface="Arial" pitchFamily="34" charset="0"/>
-              </a:rPr>
-              <a:t>Audine</a:t>
-            </a:r>
-            <a:r>
-              <a:rPr lang="en-US" altLang="ko-KR" sz="900" dirty="0" smtClean="0">
-                <a:solidFill>
-                  <a:schemeClr val="tx1">
-                    <a:lumMod val="50000"/>
-                    <a:lumOff val="50000"/>
-                  </a:schemeClr>
-                </a:solidFill>
-                <a:latin typeface="Arial" pitchFamily="34" charset="0"/>
-                <a:cs typeface="Arial" pitchFamily="34" charset="0"/>
-              </a:rPr>
-              <a:t> </a:t>
-            </a:r>
-            <a:r>
-              <a:rPr lang="en-US" altLang="ko-KR" sz="900" dirty="0" err="1" smtClean="0">
-                <a:solidFill>
-                  <a:schemeClr val="tx1">
-                    <a:lumMod val="50000"/>
-                    <a:lumOff val="50000"/>
-                  </a:schemeClr>
-                </a:solidFill>
-                <a:latin typeface="Arial" pitchFamily="34" charset="0"/>
-                <a:cs typeface="Arial" pitchFamily="34" charset="0"/>
-              </a:rPr>
-              <a:t>Amelly</a:t>
-            </a:r>
-            <a:r>
-              <a:rPr lang="en-US" altLang="ko-KR" sz="900" dirty="0" smtClean="0">
-                <a:solidFill>
-                  <a:schemeClr val="tx1">
-                    <a:lumMod val="50000"/>
-                    <a:lumOff val="50000"/>
-                  </a:schemeClr>
-                </a:solidFill>
-                <a:latin typeface="Arial" pitchFamily="34" charset="0"/>
-                <a:cs typeface="Arial" pitchFamily="34" charset="0"/>
-              </a:rPr>
-              <a:t> &amp; </a:t>
-            </a:r>
-            <a:r>
-              <a:rPr lang="en-US" altLang="ko-KR" sz="900" dirty="0" err="1" smtClean="0">
-                <a:solidFill>
-                  <a:schemeClr val="tx1">
-                    <a:lumMod val="50000"/>
-                    <a:lumOff val="50000"/>
-                  </a:schemeClr>
-                </a:solidFill>
-                <a:latin typeface="Arial" pitchFamily="34" charset="0"/>
-                <a:cs typeface="Arial" pitchFamily="34" charset="0"/>
-              </a:rPr>
-              <a:t>Mikhael</a:t>
-            </a:r>
-            <a:r>
-              <a:rPr lang="en-US" altLang="ko-KR" sz="900" dirty="0" smtClean="0">
-                <a:solidFill>
-                  <a:schemeClr val="tx1">
-                    <a:lumMod val="50000"/>
-                    <a:lumOff val="50000"/>
-                  </a:schemeClr>
-                </a:solidFill>
-                <a:latin typeface="Arial" pitchFamily="34" charset="0"/>
-                <a:cs typeface="Arial" pitchFamily="34" charset="0"/>
-              </a:rPr>
-              <a:t> </a:t>
-            </a:r>
-            <a:r>
-              <a:rPr lang="en-US" altLang="ko-KR" sz="900" dirty="0" err="1" smtClean="0">
-                <a:solidFill>
-                  <a:schemeClr val="tx1">
-                    <a:lumMod val="50000"/>
-                    <a:lumOff val="50000"/>
-                  </a:schemeClr>
-                </a:solidFill>
-                <a:latin typeface="Arial" pitchFamily="34" charset="0"/>
-                <a:cs typeface="Arial" pitchFamily="34" charset="0"/>
-              </a:rPr>
-              <a:t>Diastama</a:t>
-            </a:r>
-            <a:r>
-              <a:rPr lang="en-US" altLang="ko-KR" sz="900" dirty="0" smtClean="0">
-                <a:solidFill>
-                  <a:schemeClr val="tx1">
-                    <a:lumMod val="50000"/>
-                    <a:lumOff val="50000"/>
-                  </a:schemeClr>
-                </a:solidFill>
-                <a:latin typeface="Arial" pitchFamily="34" charset="0"/>
-                <a:cs typeface="Arial" pitchFamily="34" charset="0"/>
-              </a:rPr>
-              <a:t> </a:t>
-            </a:r>
-            <a:r>
-              <a:rPr lang="en-US" altLang="ko-KR" sz="900" dirty="0" err="1" smtClean="0">
-                <a:solidFill>
-                  <a:schemeClr val="tx1">
-                    <a:lumMod val="50000"/>
-                    <a:lumOff val="50000"/>
-                  </a:schemeClr>
-                </a:solidFill>
-                <a:latin typeface="Arial" pitchFamily="34" charset="0"/>
-                <a:cs typeface="Arial" pitchFamily="34" charset="0"/>
-              </a:rPr>
-              <a:t>Santoso</a:t>
-            </a:r>
-            <a:endParaRPr lang="ko-KR" altLang="en-US" sz="900" dirty="0">
-              <a:solidFill>
-                <a:schemeClr val="tx1">
-                  <a:lumMod val="50000"/>
-                  <a:lumOff val="50000"/>
-                </a:schemeClr>
-              </a:solidFill>
-              <a:latin typeface="Arial" pitchFamily="34" charset="0"/>
-              <a:cs typeface="Arial" pitchFamily="34" charset="0"/>
-            </a:endParaRPr>
-          </a:p>
-        </p:txBody>
-      </p:sp>
-    </p:spTree>
-    <p:extLst>
-      <p:ext uri="{BB962C8B-B14F-4D97-AF65-F5344CB8AC3E}">
-        <p14:creationId xmlns:p14="http://schemas.microsoft.com/office/powerpoint/2010/main" val="2710463833"/>
       </p:ext>
     </p:extLst>
   </p:cSld>

</xml_diff>